<commit_message>
reminders and module 2+3 info
</commit_message>
<xml_diff>
--- a/Lectures/Lecture11-Module1Review.pptx
+++ b/Lectures/Lecture11-Module1Review.pptx
@@ -6,7 +6,7 @@
     <p:sldMasterId id="2147483673" r:id="rId2"/>
   </p:sldMasterIdLst>
   <p:notesMasterIdLst>
-    <p:notesMasterId r:id="rId27"/>
+    <p:notesMasterId r:id="rId23"/>
   </p:notesMasterIdLst>
   <p:sldIdLst>
     <p:sldId id="256" r:id="rId3"/>
@@ -28,11 +28,7 @@
     <p:sldId id="506" r:id="rId19"/>
     <p:sldId id="496" r:id="rId20"/>
     <p:sldId id="473" r:id="rId21"/>
-    <p:sldId id="479" r:id="rId22"/>
-    <p:sldId id="481" r:id="rId23"/>
-    <p:sldId id="480" r:id="rId24"/>
-    <p:sldId id="482" r:id="rId25"/>
-    <p:sldId id="508" r:id="rId26"/>
+    <p:sldId id="510" r:id="rId22"/>
   </p:sldIdLst>
   <p:sldSz cx="12192000" cy="6858000"/>
   <p:notesSz cx="6858000" cy="9144000"/>
@@ -270,7 +266,7 @@
       <p15:sldGuideLst xmlns:p15="http://schemas.microsoft.com/office/powerpoint/2012/main"/>
     </p:ext>
     <p:ext uri="http://customooxmlschemas.google.com/">
-      <go:slidesCustomData xmlns:go="http://customooxmlschemas.google.com/" xmlns:p15="http://schemas.microsoft.com/office/powerpoint/2012/main" xmlns:p14="http://schemas.microsoft.com/office/powerpoint/2010/main" xmlns:com="http://schemas.openxmlformats.org/drawingml/2006/compatibility" xmlns:pvml="urn:schemas-microsoft-com:office:powerpoint" xmlns:v="urn:schemas-microsoft-com:vml" xmlns:o="urn:schemas-microsoft-com:office:office" xmlns:dgm="http://schemas.openxmlformats.org/drawingml/2006/diagram" xmlns:c="http://schemas.openxmlformats.org/drawingml/2006/chart" xmlns:mv="urn:schemas-microsoft-com:mac:vml" xmlns:mc="http://schemas.openxmlformats.org/markup-compatibility/2006" xmlns="" r:id="rId54" roundtripDataSignature="AMtx7mjFyVUGRZWio+dc9dxzYsimUxNJbg=="/>
+      <go:slidesCustomData xmlns="" xmlns:mc="http://schemas.openxmlformats.org/markup-compatibility/2006" xmlns:mv="urn:schemas-microsoft-com:mac:vml" xmlns:c="http://schemas.openxmlformats.org/drawingml/2006/chart" xmlns:dgm="http://schemas.openxmlformats.org/drawingml/2006/diagram" xmlns:o="urn:schemas-microsoft-com:office:office" xmlns:v="urn:schemas-microsoft-com:vml" xmlns:pvml="urn:schemas-microsoft-com:office:powerpoint" xmlns:com="http://schemas.openxmlformats.org/drawingml/2006/compatibility" xmlns:p14="http://schemas.microsoft.com/office/powerpoint/2010/main" xmlns:p15="http://schemas.microsoft.com/office/powerpoint/2012/main" xmlns:go="http://customooxmlschemas.google.com/" r:id="rId54" roundtripDataSignature="AMtx7mjFyVUGRZWio+dc9dxzYsimUxNJbg=="/>
     </p:ext>
   </p:extLst>
 </p:presentation>
@@ -7735,7 +7731,7 @@
           <a:p>
             <a:fld id="{37342B79-8861-BC41-8C11-7D76094F6B8E}" type="datetimeFigureOut">
               <a:rPr lang="en-US" smtClean="0"/>
-              <a:t>10/5/21</a:t>
+              <a:t>10/11/22</a:t>
             </a:fld>
             <a:endParaRPr lang="en-US"/>
           </a:p>
@@ -8000,7 +7996,7 @@
           <a:p>
             <a:fld id="{37342B79-8861-BC41-8C11-7D76094F6B8E}" type="datetimeFigureOut">
               <a:rPr lang="en-US" smtClean="0"/>
-              <a:t>10/5/21</a:t>
+              <a:t>10/11/22</a:t>
             </a:fld>
             <a:endParaRPr lang="en-US"/>
           </a:p>
@@ -8412,7 +8408,7 @@
           <a:p>
             <a:fld id="{37342B79-8861-BC41-8C11-7D76094F6B8E}" type="datetimeFigureOut">
               <a:rPr lang="en-US" smtClean="0"/>
-              <a:t>10/5/21</a:t>
+              <a:t>10/11/22</a:t>
             </a:fld>
             <a:endParaRPr lang="en-US"/>
           </a:p>
@@ -8553,7 +8549,7 @@
           <a:p>
             <a:fld id="{37342B79-8861-BC41-8C11-7D76094F6B8E}" type="datetimeFigureOut">
               <a:rPr lang="en-US" smtClean="0"/>
-              <a:t>10/5/21</a:t>
+              <a:t>10/11/22</a:t>
             </a:fld>
             <a:endParaRPr lang="en-US"/>
           </a:p>
@@ -8666,7 +8662,7 @@
           <a:p>
             <a:fld id="{37342B79-8861-BC41-8C11-7D76094F6B8E}" type="datetimeFigureOut">
               <a:rPr lang="en-US" smtClean="0"/>
-              <a:t>10/5/21</a:t>
+              <a:t>10/11/22</a:t>
             </a:fld>
             <a:endParaRPr lang="en-US"/>
           </a:p>
@@ -8977,7 +8973,7 @@
           <a:p>
             <a:fld id="{37342B79-8861-BC41-8C11-7D76094F6B8E}" type="datetimeFigureOut">
               <a:rPr lang="en-US" smtClean="0"/>
-              <a:t>10/5/21</a:t>
+              <a:t>10/11/22</a:t>
             </a:fld>
             <a:endParaRPr lang="en-US"/>
           </a:p>
@@ -9265,7 +9261,7 @@
           <a:p>
             <a:fld id="{37342B79-8861-BC41-8C11-7D76094F6B8E}" type="datetimeFigureOut">
               <a:rPr lang="en-US" smtClean="0"/>
-              <a:t>10/5/21</a:t>
+              <a:t>10/11/22</a:t>
             </a:fld>
             <a:endParaRPr lang="en-US"/>
           </a:p>
@@ -9463,7 +9459,7 @@
           <a:p>
             <a:fld id="{37342B79-8861-BC41-8C11-7D76094F6B8E}" type="datetimeFigureOut">
               <a:rPr lang="en-US" smtClean="0"/>
-              <a:t>10/5/21</a:t>
+              <a:t>10/11/22</a:t>
             </a:fld>
             <a:endParaRPr lang="en-US"/>
           </a:p>
@@ -9671,7 +9667,7 @@
           <a:p>
             <a:fld id="{37342B79-8861-BC41-8C11-7D76094F6B8E}" type="datetimeFigureOut">
               <a:rPr lang="en-US" smtClean="0"/>
-              <a:t>10/5/21</a:t>
+              <a:t>10/11/22</a:t>
             </a:fld>
             <a:endParaRPr lang="en-US"/>
           </a:p>
@@ -12281,7 +12277,7 @@
           <a:p>
             <a:fld id="{37342B79-8861-BC41-8C11-7D76094F6B8E}" type="datetimeFigureOut">
               <a:rPr lang="en-US" smtClean="0"/>
-              <a:t>10/5/21</a:t>
+              <a:t>10/11/22</a:t>
             </a:fld>
             <a:endParaRPr lang="en-US"/>
           </a:p>
@@ -12479,7 +12475,7 @@
           <a:p>
             <a:fld id="{37342B79-8861-BC41-8C11-7D76094F6B8E}" type="datetimeFigureOut">
               <a:rPr lang="en-US" smtClean="0"/>
-              <a:t>10/5/21</a:t>
+              <a:t>10/11/22</a:t>
             </a:fld>
             <a:endParaRPr lang="en-US"/>
           </a:p>
@@ -13988,7 +13984,7 @@
           <a:p>
             <a:fld id="{37342B79-8861-BC41-8C11-7D76094F6B8E}" type="datetimeFigureOut">
               <a:rPr lang="en-US" smtClean="0"/>
-              <a:t>10/5/21</a:t>
+              <a:t>10/11/22</a:t>
             </a:fld>
             <a:endParaRPr lang="en-US"/>
           </a:p>
@@ -21123,17 +21119,33 @@
                   <a:schemeClr val="tx1"/>
                 </a:solidFill>
               </a:rPr>
-              <a:t>Midterm – we will post tonight, due by Friday evening on Canvas</a:t>
+              <a:t>Midterm – we will post tomorrow, due by </a:t>
             </a:r>
-          </a:p>
-          <a:p>
+            <a:r>
+              <a:rPr lang="en-US" b="1" dirty="0">
+                <a:solidFill>
+                  <a:schemeClr val="tx1"/>
+                </a:solidFill>
+              </a:rPr>
+              <a:t>Tuesday, Oct 25</a:t>
+            </a:r>
             <a:r>
               <a:rPr lang="en-US" dirty="0">
                 <a:solidFill>
                   <a:schemeClr val="tx1"/>
                 </a:solidFill>
               </a:rPr>
-              <a:t>No Wednesday or Thursday class sessions this week</a:t>
+              <a:t> evening on Canvas</a:t>
+            </a:r>
+          </a:p>
+          <a:p>
+            <a:r>
+              <a:rPr lang="en-US" dirty="0">
+                <a:solidFill>
+                  <a:schemeClr val="tx1"/>
+                </a:solidFill>
+              </a:rPr>
+              <a:t>No Thursday class sessions this week</a:t>
             </a:r>
             <a:br>
               <a:rPr lang="en-US" dirty="0"/>
@@ -21164,7 +21176,7 @@
                   <a:schemeClr val="tx1"/>
                 </a:solidFill>
               </a:rPr>
-              <a:t>Coming Up Next Week:</a:t>
+              <a:t>Coming Up After Fall Break:</a:t>
             </a:r>
           </a:p>
           <a:p>
@@ -21200,11 +21212,50 @@
             </a:r>
           </a:p>
           <a:p>
+            <a:pPr lvl="1"/>
             <a:r>
               <a:rPr lang="en-US" dirty="0">
                 <a:solidFill>
                   <a:schemeClr val="tx1"/>
                 </a:solidFill>
+                <a:highlight>
+                  <a:srgbClr val="FFFF00"/>
+                </a:highlight>
+              </a:rPr>
+              <a:t>Change in location: </a:t>
+            </a:r>
+            <a:r>
+              <a:rPr lang="en-US" dirty="0" err="1">
+                <a:solidFill>
+                  <a:schemeClr val="tx1"/>
+                </a:solidFill>
+                <a:highlight>
+                  <a:srgbClr val="FFFF00"/>
+                </a:highlight>
+              </a:rPr>
+              <a:t>Rangos</a:t>
+            </a:r>
+            <a:r>
+              <a:rPr lang="en-US" dirty="0">
+                <a:solidFill>
+                  <a:schemeClr val="tx1"/>
+                </a:solidFill>
+                <a:highlight>
+                  <a:srgbClr val="FFFF00"/>
+                </a:highlight>
+              </a:rPr>
+              <a:t> 3 in Cohen University Center</a:t>
+            </a:r>
+          </a:p>
+          <a:p>
+            <a:r>
+              <a:rPr lang="en-US" dirty="0">
+                <a:solidFill>
+                  <a:schemeClr val="tx1"/>
+                </a:solidFill>
+                <a:highlight>
+                  <a:srgbClr val="FFFF00"/>
+                </a:highlight>
               </a:rPr>
               <a:t>No Monday Update Assignment</a:t>
             </a:r>
@@ -21284,490 +21335,6 @@
       </p:grpSpPr>
       <p:sp>
         <p:nvSpPr>
-          <p:cNvPr id="3" name="Title 2">
-            <a:extLst>
-              <a:ext uri="{FF2B5EF4-FFF2-40B4-BE49-F238E27FC236}">
-                <a16:creationId xmlns:a16="http://schemas.microsoft.com/office/drawing/2014/main" id="{9323871C-7CA8-1448-8FFC-1AE6E1838941}"/>
-              </a:ext>
-            </a:extLst>
-          </p:cNvPr>
-          <p:cNvSpPr>
-            <a:spLocks noGrp="1"/>
-          </p:cNvSpPr>
-          <p:nvPr>
-            <p:ph type="title"/>
-          </p:nvPr>
-        </p:nvSpPr>
-        <p:spPr/>
-        <p:txBody>
-          <a:bodyPr/>
-          <a:lstStyle/>
-          <a:p>
-            <a:r>
-              <a:rPr lang="en-US" dirty="0"/>
-              <a:t>Some Open Research Questions</a:t>
-            </a:r>
-          </a:p>
-        </p:txBody>
-      </p:sp>
-      <p:pic>
-        <p:nvPicPr>
-          <p:cNvPr id="6" name="Picture 5">
-            <a:extLst>
-              <a:ext uri="{FF2B5EF4-FFF2-40B4-BE49-F238E27FC236}">
-                <a16:creationId xmlns:a16="http://schemas.microsoft.com/office/drawing/2014/main" id="{4B9B5C17-6333-3542-BF92-961541BDC881}"/>
-              </a:ext>
-            </a:extLst>
-          </p:cNvPr>
-          <p:cNvPicPr>
-            <a:picLocks noChangeAspect="1"/>
-          </p:cNvPicPr>
-          <p:nvPr/>
-        </p:nvPicPr>
-        <p:blipFill>
-          <a:blip r:embed="rId2"/>
-          <a:stretch>
-            <a:fillRect/>
-          </a:stretch>
-        </p:blipFill>
-        <p:spPr>
-          <a:xfrm>
-            <a:off x="1169439" y="1257300"/>
-            <a:ext cx="9853121" cy="5023746"/>
-          </a:xfrm>
-          <a:prstGeom prst="rect">
-            <a:avLst/>
-          </a:prstGeom>
-        </p:spPr>
-      </p:pic>
-    </p:spTree>
-    <p:extLst>
-      <p:ext uri="{BB962C8B-B14F-4D97-AF65-F5344CB8AC3E}">
-        <p14:creationId xmlns:p14="http://schemas.microsoft.com/office/powerpoint/2010/main" val="1478637945"/>
-      </p:ext>
-    </p:extLst>
-  </p:cSld>
-  <p:clrMapOvr>
-    <a:masterClrMapping/>
-  </p:clrMapOvr>
-</p:sld>
-</file>
-
-<file path=ppt/slides/slide21.xml><?xml version="1.0" encoding="utf-8"?>
-<p:sld xmlns:a="http://schemas.openxmlformats.org/drawingml/2006/main" xmlns:r="http://schemas.openxmlformats.org/officeDocument/2006/relationships" xmlns:p="http://schemas.openxmlformats.org/presentationml/2006/main">
-  <p:cSld>
-    <p:spTree>
-      <p:nvGrpSpPr>
-        <p:cNvPr id="1" name=""/>
-        <p:cNvGrpSpPr/>
-        <p:nvPr/>
-      </p:nvGrpSpPr>
-      <p:grpSpPr>
-        <a:xfrm>
-          <a:off x="0" y="0"/>
-          <a:ext cx="0" cy="0"/>
-          <a:chOff x="0" y="0"/>
-          <a:chExt cx="0" cy="0"/>
-        </a:xfrm>
-      </p:grpSpPr>
-      <p:sp>
-        <p:nvSpPr>
-          <p:cNvPr id="3" name="Title 2">
-            <a:extLst>
-              <a:ext uri="{FF2B5EF4-FFF2-40B4-BE49-F238E27FC236}">
-                <a16:creationId xmlns:a16="http://schemas.microsoft.com/office/drawing/2014/main" id="{9323871C-7CA8-1448-8FFC-1AE6E1838941}"/>
-              </a:ext>
-            </a:extLst>
-          </p:cNvPr>
-          <p:cNvSpPr>
-            <a:spLocks noGrp="1"/>
-          </p:cNvSpPr>
-          <p:nvPr>
-            <p:ph type="title"/>
-          </p:nvPr>
-        </p:nvSpPr>
-        <p:spPr/>
-        <p:txBody>
-          <a:bodyPr/>
-          <a:lstStyle/>
-          <a:p>
-            <a:r>
-              <a:rPr lang="en-US" dirty="0"/>
-              <a:t>Some Open Research Questions</a:t>
-            </a:r>
-          </a:p>
-        </p:txBody>
-      </p:sp>
-      <p:sp>
-        <p:nvSpPr>
-          <p:cNvPr id="4" name="Text Placeholder 3">
-            <a:extLst>
-              <a:ext uri="{FF2B5EF4-FFF2-40B4-BE49-F238E27FC236}">
-                <a16:creationId xmlns:a16="http://schemas.microsoft.com/office/drawing/2014/main" id="{5E600BA7-FA45-884F-9820-9E5F2CB7AA48}"/>
-              </a:ext>
-            </a:extLst>
-          </p:cNvPr>
-          <p:cNvSpPr>
-            <a:spLocks noGrp="1"/>
-          </p:cNvSpPr>
-          <p:nvPr>
-            <p:ph type="body" idx="1"/>
-          </p:nvPr>
-        </p:nvSpPr>
-        <p:spPr/>
-        <p:txBody>
-          <a:bodyPr/>
-          <a:lstStyle/>
-          <a:p>
-            <a:r>
-              <a:rPr lang="en-US" dirty="0"/>
-              <a:t>The SVM loss function will find the “best” separating hyperplane overall, but perhaps we could draw a better hyperplane to separate just </a:t>
-            </a:r>
-            <a:r>
-              <a:rPr lang="en-US" i="1" dirty="0"/>
-              <a:t>k</a:t>
-            </a:r>
-            <a:r>
-              <a:rPr lang="en-US" dirty="0"/>
-              <a:t> positive examples?</a:t>
-            </a:r>
-            <a:br>
-              <a:rPr lang="en-US" dirty="0"/>
-            </a:br>
-            <a:endParaRPr lang="en-US" dirty="0"/>
-          </a:p>
-          <a:p>
-            <a:r>
-              <a:rPr lang="en-US" i="1" dirty="0" err="1"/>
-              <a:t>Transductive</a:t>
-            </a:r>
-            <a:r>
-              <a:rPr lang="en-US" dirty="0"/>
-              <a:t> method: needs to be aware of the test set </a:t>
-            </a:r>
-            <a:r>
-              <a:rPr lang="en-US" b="1" dirty="0"/>
-              <a:t>without labels</a:t>
-            </a:r>
-            <a:r>
-              <a:rPr lang="en-US" dirty="0"/>
-              <a:t> to select just </a:t>
-            </a:r>
-            <a:r>
-              <a:rPr lang="en-US" i="1" dirty="0"/>
-              <a:t>k</a:t>
-            </a:r>
-            <a:r>
-              <a:rPr lang="en-US" dirty="0"/>
-              <a:t> test examples.</a:t>
-            </a:r>
-            <a:br>
-              <a:rPr lang="en-US" dirty="0"/>
-            </a:br>
-            <a:endParaRPr lang="en-US" dirty="0"/>
-          </a:p>
-          <a:p>
-            <a:r>
-              <a:rPr lang="en-US" dirty="0"/>
-              <a:t>Modified gradient descent procedure to project gradient direction for L2-regularized SVM loss onto a “feasible solution cone” such that </a:t>
-            </a:r>
-            <a:r>
-              <a:rPr lang="en-US" u="sng" dirty="0"/>
-              <a:t>no more than</a:t>
-            </a:r>
-            <a:r>
-              <a:rPr lang="en-US" dirty="0"/>
-              <a:t> </a:t>
-            </a:r>
-            <a:r>
-              <a:rPr lang="en-US" i="1" dirty="0"/>
-              <a:t>k</a:t>
-            </a:r>
-            <a:r>
-              <a:rPr lang="en-US" dirty="0"/>
-              <a:t> test examples will be predicted positive after the step.</a:t>
-            </a:r>
-          </a:p>
-        </p:txBody>
-      </p:sp>
-    </p:spTree>
-    <p:extLst>
-      <p:ext uri="{BB962C8B-B14F-4D97-AF65-F5344CB8AC3E}">
-        <p14:creationId xmlns:p14="http://schemas.microsoft.com/office/powerpoint/2010/main" val="94907443"/>
-      </p:ext>
-    </p:extLst>
-  </p:cSld>
-  <p:clrMapOvr>
-    <a:masterClrMapping/>
-  </p:clrMapOvr>
-</p:sld>
-</file>
-
-<file path=ppt/slides/slide22.xml><?xml version="1.0" encoding="utf-8"?>
-<p:sld xmlns:a="http://schemas.openxmlformats.org/drawingml/2006/main" xmlns:r="http://schemas.openxmlformats.org/officeDocument/2006/relationships" xmlns:p="http://schemas.openxmlformats.org/presentationml/2006/main">
-  <p:cSld>
-    <p:spTree>
-      <p:nvGrpSpPr>
-        <p:cNvPr id="1" name=""/>
-        <p:cNvGrpSpPr/>
-        <p:nvPr/>
-      </p:nvGrpSpPr>
-      <p:grpSpPr>
-        <a:xfrm>
-          <a:off x="0" y="0"/>
-          <a:ext cx="0" cy="0"/>
-          <a:chOff x="0" y="0"/>
-          <a:chExt cx="0" cy="0"/>
-        </a:xfrm>
-      </p:grpSpPr>
-      <p:sp>
-        <p:nvSpPr>
-          <p:cNvPr id="3" name="Title 2">
-            <a:extLst>
-              <a:ext uri="{FF2B5EF4-FFF2-40B4-BE49-F238E27FC236}">
-                <a16:creationId xmlns:a16="http://schemas.microsoft.com/office/drawing/2014/main" id="{9323871C-7CA8-1448-8FFC-1AE6E1838941}"/>
-              </a:ext>
-            </a:extLst>
-          </p:cNvPr>
-          <p:cNvSpPr>
-            <a:spLocks noGrp="1"/>
-          </p:cNvSpPr>
-          <p:nvPr>
-            <p:ph type="title"/>
-          </p:nvPr>
-        </p:nvSpPr>
-        <p:spPr/>
-        <p:txBody>
-          <a:bodyPr/>
-          <a:lstStyle/>
-          <a:p>
-            <a:r>
-              <a:rPr lang="en-US" dirty="0"/>
-              <a:t>Some Open Research Questions</a:t>
-            </a:r>
-          </a:p>
-        </p:txBody>
-      </p:sp>
-      <p:pic>
-        <p:nvPicPr>
-          <p:cNvPr id="2" name="Picture 1">
-            <a:extLst>
-              <a:ext uri="{FF2B5EF4-FFF2-40B4-BE49-F238E27FC236}">
-                <a16:creationId xmlns:a16="http://schemas.microsoft.com/office/drawing/2014/main" id="{23F8960D-806C-F441-9A23-1578C38467D8}"/>
-              </a:ext>
-            </a:extLst>
-          </p:cNvPr>
-          <p:cNvPicPr>
-            <a:picLocks noChangeAspect="1"/>
-          </p:cNvPicPr>
-          <p:nvPr/>
-        </p:nvPicPr>
-        <p:blipFill>
-          <a:blip r:embed="rId2"/>
-          <a:stretch>
-            <a:fillRect/>
-          </a:stretch>
-        </p:blipFill>
-        <p:spPr>
-          <a:xfrm>
-            <a:off x="2749550" y="1371600"/>
-            <a:ext cx="6692900" cy="4114800"/>
-          </a:xfrm>
-          <a:prstGeom prst="rect">
-            <a:avLst/>
-          </a:prstGeom>
-        </p:spPr>
-      </p:pic>
-    </p:spTree>
-    <p:extLst>
-      <p:ext uri="{BB962C8B-B14F-4D97-AF65-F5344CB8AC3E}">
-        <p14:creationId xmlns:p14="http://schemas.microsoft.com/office/powerpoint/2010/main" val="1715242992"/>
-      </p:ext>
-    </p:extLst>
-  </p:cSld>
-  <p:clrMapOvr>
-    <a:masterClrMapping/>
-  </p:clrMapOvr>
-</p:sld>
-</file>
-
-<file path=ppt/slides/slide23.xml><?xml version="1.0" encoding="utf-8"?>
-<p:sld xmlns:a="http://schemas.openxmlformats.org/drawingml/2006/main" xmlns:r="http://schemas.openxmlformats.org/officeDocument/2006/relationships" xmlns:p="http://schemas.openxmlformats.org/presentationml/2006/main">
-  <p:cSld>
-    <p:spTree>
-      <p:nvGrpSpPr>
-        <p:cNvPr id="1" name=""/>
-        <p:cNvGrpSpPr/>
-        <p:nvPr/>
-      </p:nvGrpSpPr>
-      <p:grpSpPr>
-        <a:xfrm>
-          <a:off x="0" y="0"/>
-          <a:ext cx="0" cy="0"/>
-          <a:chOff x="0" y="0"/>
-          <a:chExt cx="0" cy="0"/>
-        </a:xfrm>
-      </p:grpSpPr>
-      <p:sp>
-        <p:nvSpPr>
-          <p:cNvPr id="3" name="Title 2">
-            <a:extLst>
-              <a:ext uri="{FF2B5EF4-FFF2-40B4-BE49-F238E27FC236}">
-                <a16:creationId xmlns:a16="http://schemas.microsoft.com/office/drawing/2014/main" id="{9323871C-7CA8-1448-8FFC-1AE6E1838941}"/>
-              </a:ext>
-            </a:extLst>
-          </p:cNvPr>
-          <p:cNvSpPr>
-            <a:spLocks noGrp="1"/>
-          </p:cNvSpPr>
-          <p:nvPr>
-            <p:ph type="title"/>
-          </p:nvPr>
-        </p:nvSpPr>
-        <p:spPr/>
-        <p:txBody>
-          <a:bodyPr/>
-          <a:lstStyle/>
-          <a:p>
-            <a:r>
-              <a:rPr lang="en-US" dirty="0"/>
-              <a:t>Some Open Research Questions</a:t>
-            </a:r>
-          </a:p>
-        </p:txBody>
-      </p:sp>
-      <p:sp>
-        <p:nvSpPr>
-          <p:cNvPr id="4" name="Text Placeholder 3">
-            <a:extLst>
-              <a:ext uri="{FF2B5EF4-FFF2-40B4-BE49-F238E27FC236}">
-                <a16:creationId xmlns:a16="http://schemas.microsoft.com/office/drawing/2014/main" id="{5E600BA7-FA45-884F-9820-9E5F2CB7AA48}"/>
-              </a:ext>
-            </a:extLst>
-          </p:cNvPr>
-          <p:cNvSpPr>
-            <a:spLocks noGrp="1"/>
-          </p:cNvSpPr>
-          <p:nvPr>
-            <p:ph type="body" idx="1"/>
-          </p:nvPr>
-        </p:nvSpPr>
-        <p:spPr>
-          <a:xfrm>
-            <a:off x="415600" y="1219133"/>
-            <a:ext cx="11360700" cy="5234804"/>
-          </a:xfrm>
-        </p:spPr>
-        <p:txBody>
-          <a:bodyPr/>
-          <a:lstStyle/>
-          <a:p>
-            <a:pPr marL="76200" indent="0">
-              <a:buNone/>
-            </a:pPr>
-            <a:r>
-              <a:rPr lang="en-US" dirty="0"/>
-              <a:t>Paper shows improvements on synthetic examples and some “standard” datasets, but still more to investigate:</a:t>
-            </a:r>
-            <a:br>
-              <a:rPr lang="en-US" dirty="0"/>
-            </a:br>
-            <a:endParaRPr lang="en-US" dirty="0"/>
-          </a:p>
-          <a:p>
-            <a:r>
-              <a:rPr lang="en-US" dirty="0"/>
-              <a:t>Can be slow to converge on larger datasets</a:t>
-            </a:r>
-            <a:br>
-              <a:rPr lang="en-US" dirty="0"/>
-            </a:br>
-            <a:endParaRPr lang="en-US" dirty="0"/>
-          </a:p>
-          <a:p>
-            <a:r>
-              <a:rPr lang="en-US" dirty="0"/>
-              <a:t>“At most” </a:t>
-            </a:r>
-            <a:r>
-              <a:rPr lang="en-US" i="1" dirty="0"/>
-              <a:t>k</a:t>
-            </a:r>
-            <a:r>
-              <a:rPr lang="en-US" dirty="0"/>
-              <a:t> examples can yield many fewer than the desired </a:t>
-            </a:r>
-            <a:r>
-              <a:rPr lang="en-US" i="1" dirty="0"/>
-              <a:t>k</a:t>
-            </a:r>
-            <a:r>
-              <a:rPr lang="en-US" dirty="0"/>
-              <a:t>, particularly for rare events (why doesn’t the algorithm target </a:t>
-            </a:r>
-            <a:r>
-              <a:rPr lang="en-US" i="1" dirty="0"/>
-              <a:t>exactly k</a:t>
-            </a:r>
-            <a:r>
-              <a:rPr lang="en-US" dirty="0"/>
-              <a:t>?)</a:t>
-            </a:r>
-            <a:br>
-              <a:rPr lang="en-US" dirty="0"/>
-            </a:br>
-            <a:endParaRPr lang="en-US" dirty="0"/>
-          </a:p>
-          <a:p>
-            <a:r>
-              <a:rPr lang="en-US" dirty="0"/>
-              <a:t> Although creating a “top k” boundary, still penalizes false positives and false negatives equally during optimization</a:t>
-            </a:r>
-            <a:br>
-              <a:rPr lang="en-US" dirty="0"/>
-            </a:br>
-            <a:endParaRPr lang="en-US" dirty="0"/>
-          </a:p>
-          <a:p>
-            <a:r>
-              <a:rPr lang="en-US" dirty="0"/>
-              <a:t>Can we do better at the top, even if we don’t have access to the test list?</a:t>
-            </a:r>
-          </a:p>
-        </p:txBody>
-      </p:sp>
-    </p:spTree>
-    <p:extLst>
-      <p:ext uri="{BB962C8B-B14F-4D97-AF65-F5344CB8AC3E}">
-        <p14:creationId xmlns:p14="http://schemas.microsoft.com/office/powerpoint/2010/main" val="4118118316"/>
-      </p:ext>
-    </p:extLst>
-  </p:cSld>
-  <p:clrMapOvr>
-    <a:masterClrMapping/>
-  </p:clrMapOvr>
-</p:sld>
-</file>
-
-<file path=ppt/slides/slide24.xml><?xml version="1.0" encoding="utf-8"?>
-<p:sld xmlns:a="http://schemas.openxmlformats.org/drawingml/2006/main" xmlns:r="http://schemas.openxmlformats.org/officeDocument/2006/relationships" xmlns:p="http://schemas.openxmlformats.org/presentationml/2006/main">
-  <p:cSld>
-    <p:spTree>
-      <p:nvGrpSpPr>
-        <p:cNvPr id="1" name=""/>
-        <p:cNvGrpSpPr/>
-        <p:nvPr/>
-      </p:nvGrpSpPr>
-      <p:grpSpPr>
-        <a:xfrm>
-          <a:off x="0" y="0"/>
-          <a:ext cx="0" cy="0"/>
-          <a:chOff x="0" y="0"/>
-          <a:chExt cx="0" cy="0"/>
-        </a:xfrm>
-      </p:grpSpPr>
-      <p:sp>
-        <p:nvSpPr>
           <p:cNvPr id="2" name="Content Placeholder 1"/>
           <p:cNvSpPr>
             <a:spLocks noGrp="1"/>
@@ -21800,17 +21367,33 @@
                   <a:schemeClr val="tx1"/>
                 </a:solidFill>
               </a:rPr>
-              <a:t>Midterm – we will post tonight, due by Friday evening on Canvas</a:t>
+              <a:t>Midterm – we will post tomorrow, due by </a:t>
             </a:r>
-          </a:p>
-          <a:p>
+            <a:r>
+              <a:rPr lang="en-US" b="1" dirty="0">
+                <a:solidFill>
+                  <a:schemeClr val="tx1"/>
+                </a:solidFill>
+              </a:rPr>
+              <a:t>Tuesday, Oct 25</a:t>
+            </a:r>
             <a:r>
               <a:rPr lang="en-US" dirty="0">
                 <a:solidFill>
                   <a:schemeClr val="tx1"/>
                 </a:solidFill>
               </a:rPr>
-              <a:t>No Wednesday or Thursday class sessions this week</a:t>
+              <a:t> evening on Canvas</a:t>
+            </a:r>
+          </a:p>
+          <a:p>
+            <a:r>
+              <a:rPr lang="en-US" dirty="0">
+                <a:solidFill>
+                  <a:schemeClr val="tx1"/>
+                </a:solidFill>
+              </a:rPr>
+              <a:t>No Thursday class sessions this week</a:t>
             </a:r>
             <a:br>
               <a:rPr lang="en-US" dirty="0"/>
@@ -21841,7 +21424,7 @@
                   <a:schemeClr val="tx1"/>
                 </a:solidFill>
               </a:rPr>
-              <a:t>Coming Up Next Week:</a:t>
+              <a:t>Coming Up After Fall Break:</a:t>
             </a:r>
           </a:p>
           <a:p>
@@ -21877,11 +21460,50 @@
             </a:r>
           </a:p>
           <a:p>
+            <a:pPr lvl="1"/>
             <a:r>
               <a:rPr lang="en-US" dirty="0">
                 <a:solidFill>
                   <a:schemeClr val="tx1"/>
                 </a:solidFill>
+                <a:highlight>
+                  <a:srgbClr val="FFFF00"/>
+                </a:highlight>
+              </a:rPr>
+              <a:t>Change in location: </a:t>
+            </a:r>
+            <a:r>
+              <a:rPr lang="en-US" dirty="0" err="1">
+                <a:solidFill>
+                  <a:schemeClr val="tx1"/>
+                </a:solidFill>
+                <a:highlight>
+                  <a:srgbClr val="FFFF00"/>
+                </a:highlight>
+              </a:rPr>
+              <a:t>Rangos</a:t>
+            </a:r>
+            <a:r>
+              <a:rPr lang="en-US" dirty="0">
+                <a:solidFill>
+                  <a:schemeClr val="tx1"/>
+                </a:solidFill>
+                <a:highlight>
+                  <a:srgbClr val="FFFF00"/>
+                </a:highlight>
+              </a:rPr>
+              <a:t> 3 in Cohen University Center</a:t>
+            </a:r>
+          </a:p>
+          <a:p>
+            <a:r>
+              <a:rPr lang="en-US" dirty="0">
+                <a:solidFill>
+                  <a:schemeClr val="tx1"/>
+                </a:solidFill>
+                <a:highlight>
+                  <a:srgbClr val="FFFF00"/>
+                </a:highlight>
               </a:rPr>
               <a:t>No Monday Update Assignment</a:t>
             </a:r>
@@ -21932,7 +21554,7 @@
     </p:spTree>
     <p:extLst>
       <p:ext uri="{BB962C8B-B14F-4D97-AF65-F5344CB8AC3E}">
-        <p14:creationId xmlns:p14="http://schemas.microsoft.com/office/powerpoint/2010/main" val="1893128819"/>
+        <p14:creationId xmlns:p14="http://schemas.microsoft.com/office/powerpoint/2010/main" val="1652237085"/>
       </p:ext>
     </p:extLst>
   </p:cSld>
@@ -21980,7 +21602,26 @@
                   <a:schemeClr val="tx1"/>
                 </a:solidFill>
               </a:rPr>
-              <a:t>Last project update Assignment October 18 (week after next) with final models</a:t>
+              <a:t>Last project update Assignment </a:t>
+            </a:r>
+            <a:r>
+              <a:rPr lang="en-US" dirty="0">
+                <a:solidFill>
+                  <a:schemeClr val="tx1"/>
+                </a:solidFill>
+                <a:highlight>
+                  <a:srgbClr val="FFFF00"/>
+                </a:highlight>
+              </a:rPr>
+              <a:t>October 18 </a:t>
+            </a:r>
+            <a:r>
+              <a:rPr lang="en-US" dirty="0">
+                <a:solidFill>
+                  <a:schemeClr val="tx1"/>
+                </a:solidFill>
+              </a:rPr>
+              <a:t>(week after next) with final models</a:t>
             </a:r>
             <a:br>
               <a:rPr lang="en-US" dirty="0">
@@ -22024,7 +21665,23 @@
                   <a:schemeClr val="tx1"/>
                 </a:solidFill>
               </a:rPr>
-              <a:t>Each group responsible for applying one approach from each class (may implement from scratch or use existing packages)</a:t>
+              <a:t>Each group responsible for applying </a:t>
+            </a:r>
+            <a:r>
+              <a:rPr lang="en-US" u="sng" dirty="0">
+                <a:solidFill>
+                  <a:schemeClr val="tx1"/>
+                </a:solidFill>
+              </a:rPr>
+              <a:t>one approach from each class</a:t>
+            </a:r>
+            <a:r>
+              <a:rPr lang="en-US" dirty="0">
+                <a:solidFill>
+                  <a:schemeClr val="tx1"/>
+                </a:solidFill>
+              </a:rPr>
+              <a:t> (may implement from scratch or use existing packages)</a:t>
             </a:r>
             <a:br>
               <a:rPr lang="en-US" dirty="0">

</xml_diff>